<commit_message>
completed slides on open source toolkits
</commit_message>
<xml_diff>
--- a/doc/slides/day2/session2/Toolkits.pptx
+++ b/doc/slides/day2/session2/Toolkits.pptx
@@ -204,7 +204,7 @@
             <a:fld id="{49F2750B-51CC-9342-BA42-3CEC006D4BEE}" type="datetimeFigureOut">
               <a:rPr lang="en-US" smtClean="0"/>
               <a:pPr/>
-              <a:t>9/3/12</a:t>
+              <a:t>9/4/12</a:t>
             </a:fld>
             <a:endParaRPr lang="en-US"/>
           </a:p>
@@ -562,11 +562,11 @@
             </a:r>
             <a:r>
               <a:rPr lang="en-US" baseline="0" dirty="0" smtClean="0"/>
-              <a:t>. Exercise: do simple sequence conversion in any of these. </a:t>
-            </a:r>
-            <a:r>
-              <a:rPr lang="en-US" baseline="0" smtClean="0"/>
-              <a:t>Reference: http://dx.doi.org/10.1371/journal.pcbi.1000589</a:t>
+              <a:t>. Exercise:</a:t>
+            </a:r>
+            <a:r>
+              <a:rPr lang="en-US" baseline="0" dirty="0" smtClean="0"/>
+              <a:t> install as non-root</a:t>
             </a:r>
             <a:endParaRPr lang="en-US" dirty="0"/>
           </a:p>
@@ -786,7 +786,7 @@
             <a:fld id="{8B6559E1-F047-C244-B3F0-03E07E42B642}" type="datetimeFigureOut">
               <a:rPr lang="en-US" smtClean="0"/>
               <a:pPr/>
-              <a:t>9/3/12</a:t>
+              <a:t>9/4/12</a:t>
             </a:fld>
             <a:endParaRPr lang="en-US"/>
           </a:p>
@@ -953,7 +953,7 @@
             <a:fld id="{8B6559E1-F047-C244-B3F0-03E07E42B642}" type="datetimeFigureOut">
               <a:rPr lang="en-US" smtClean="0"/>
               <a:pPr/>
-              <a:t>9/3/12</a:t>
+              <a:t>9/4/12</a:t>
             </a:fld>
             <a:endParaRPr lang="en-US"/>
           </a:p>
@@ -1130,7 +1130,7 @@
             <a:fld id="{8B6559E1-F047-C244-B3F0-03E07E42B642}" type="datetimeFigureOut">
               <a:rPr lang="en-US" smtClean="0"/>
               <a:pPr/>
-              <a:t>9/3/12</a:t>
+              <a:t>9/4/12</a:t>
             </a:fld>
             <a:endParaRPr lang="en-US"/>
           </a:p>
@@ -1297,7 +1297,7 @@
             <a:fld id="{8B6559E1-F047-C244-B3F0-03E07E42B642}" type="datetimeFigureOut">
               <a:rPr lang="en-US" smtClean="0"/>
               <a:pPr/>
-              <a:t>9/3/12</a:t>
+              <a:t>9/4/12</a:t>
             </a:fld>
             <a:endParaRPr lang="en-US"/>
           </a:p>
@@ -1540,7 +1540,7 @@
             <a:fld id="{8B6559E1-F047-C244-B3F0-03E07E42B642}" type="datetimeFigureOut">
               <a:rPr lang="en-US" smtClean="0"/>
               <a:pPr/>
-              <a:t>9/3/12</a:t>
+              <a:t>9/4/12</a:t>
             </a:fld>
             <a:endParaRPr lang="en-US"/>
           </a:p>
@@ -1825,7 +1825,7 @@
             <a:fld id="{8B6559E1-F047-C244-B3F0-03E07E42B642}" type="datetimeFigureOut">
               <a:rPr lang="en-US" smtClean="0"/>
               <a:pPr/>
-              <a:t>9/3/12</a:t>
+              <a:t>9/4/12</a:t>
             </a:fld>
             <a:endParaRPr lang="en-US"/>
           </a:p>
@@ -2244,7 +2244,7 @@
             <a:fld id="{8B6559E1-F047-C244-B3F0-03E07E42B642}" type="datetimeFigureOut">
               <a:rPr lang="en-US" smtClean="0"/>
               <a:pPr/>
-              <a:t>9/3/12</a:t>
+              <a:t>9/4/12</a:t>
             </a:fld>
             <a:endParaRPr lang="en-US"/>
           </a:p>
@@ -2359,7 +2359,7 @@
             <a:fld id="{8B6559E1-F047-C244-B3F0-03E07E42B642}" type="datetimeFigureOut">
               <a:rPr lang="en-US" smtClean="0"/>
               <a:pPr/>
-              <a:t>9/3/12</a:t>
+              <a:t>9/4/12</a:t>
             </a:fld>
             <a:endParaRPr lang="en-US"/>
           </a:p>
@@ -2451,7 +2451,7 @@
             <a:fld id="{8B6559E1-F047-C244-B3F0-03E07E42B642}" type="datetimeFigureOut">
               <a:rPr lang="en-US" smtClean="0"/>
               <a:pPr/>
-              <a:t>9/3/12</a:t>
+              <a:t>9/4/12</a:t>
             </a:fld>
             <a:endParaRPr lang="en-US"/>
           </a:p>
@@ -2725,7 +2725,7 @@
             <a:fld id="{8B6559E1-F047-C244-B3F0-03E07E42B642}" type="datetimeFigureOut">
               <a:rPr lang="en-US" smtClean="0"/>
               <a:pPr/>
-              <a:t>9/3/12</a:t>
+              <a:t>9/4/12</a:t>
             </a:fld>
             <a:endParaRPr lang="en-US"/>
           </a:p>
@@ -2975,7 +2975,7 @@
             <a:fld id="{8B6559E1-F047-C244-B3F0-03E07E42B642}" type="datetimeFigureOut">
               <a:rPr lang="en-US" smtClean="0"/>
               <a:pPr/>
-              <a:t>9/3/12</a:t>
+              <a:t>9/4/12</a:t>
             </a:fld>
             <a:endParaRPr lang="en-US"/>
           </a:p>
@@ -3185,7 +3185,7 @@
             <a:fld id="{8B6559E1-F047-C244-B3F0-03E07E42B642}" type="datetimeFigureOut">
               <a:rPr lang="en-US" smtClean="0"/>
               <a:pPr/>
-              <a:t>9/3/12</a:t>
+              <a:t>9/4/12</a:t>
             </a:fld>
             <a:endParaRPr lang="en-US"/>
           </a:p>
@@ -3607,6 +3607,13 @@
   <p:clrMapOvr>
     <a:masterClrMapping/>
   </p:clrMapOvr>
+  <p:timing>
+    <p:tnLst>
+      <p:par>
+        <p:cTn id="1" dur="indefinite" restart="never" nodeType="tmRoot"/>
+      </p:par>
+    </p:tnLst>
+  </p:timing>
 </p:sld>
 </file>
 
@@ -3652,20 +3659,140 @@
       </p:sp>
       <p:sp>
         <p:nvSpPr>
-          <p:cNvPr id="3" name="Content Placeholder 2"/>
-          <p:cNvSpPr>
-            <a:spLocks noGrp="1"/>
-          </p:cNvSpPr>
-          <p:nvPr>
-            <p:ph idx="1"/>
-          </p:nvPr>
-        </p:nvSpPr>
-        <p:spPr/>
-        <p:txBody>
-          <a:bodyPr/>
-          <a:lstStyle/>
-          <a:p>
-            <a:endParaRPr lang="en-US"/>
+          <p:cNvPr id="4" name="Content Placeholder 3"/>
+          <p:cNvSpPr>
+            <a:spLocks noGrp="1"/>
+          </p:cNvSpPr>
+          <p:nvPr>
+            <p:ph sz="half" idx="1"/>
+          </p:nvPr>
+        </p:nvSpPr>
+        <p:spPr/>
+        <p:txBody>
+          <a:bodyPr>
+            <a:normAutofit lnSpcReduction="10000"/>
+          </a:bodyPr>
+          <a:lstStyle/>
+          <a:p>
+            <a:r>
+              <a:rPr lang="en-US" dirty="0" smtClean="0"/>
+              <a:t>Pro:</a:t>
+            </a:r>
+          </a:p>
+          <a:p>
+            <a:pPr lvl="1"/>
+            <a:r>
+              <a:rPr lang="en-US" dirty="0" smtClean="0"/>
+              <a:t>Excellent numerical capabilities</a:t>
+            </a:r>
+          </a:p>
+          <a:p>
+            <a:pPr lvl="1"/>
+            <a:r>
+              <a:rPr lang="en-US" dirty="0" smtClean="0"/>
+              <a:t>CRAN</a:t>
+            </a:r>
+          </a:p>
+          <a:p>
+            <a:pPr lvl="1"/>
+            <a:r>
+              <a:rPr lang="en-US" dirty="0" smtClean="0"/>
+              <a:t>Graphics and plotting</a:t>
+            </a:r>
+          </a:p>
+          <a:p>
+            <a:r>
+              <a:rPr lang="en-US" dirty="0" smtClean="0"/>
+              <a:t>Con:</a:t>
+            </a:r>
+          </a:p>
+          <a:p>
+            <a:pPr lvl="1"/>
+            <a:r>
+              <a:rPr lang="en-US" dirty="0" smtClean="0"/>
+              <a:t>Less "</a:t>
+            </a:r>
+            <a:r>
+              <a:rPr lang="en-US" dirty="0" err="1" smtClean="0"/>
+              <a:t>sysadmin</a:t>
+            </a:r>
+            <a:r>
+              <a:rPr lang="en-US" dirty="0" smtClean="0"/>
+              <a:t>" functionality</a:t>
+            </a:r>
+          </a:p>
+          <a:p>
+            <a:pPr lvl="1"/>
+            <a:r>
+              <a:rPr lang="en-US" dirty="0" smtClean="0"/>
+              <a:t>Non-standard install</a:t>
+            </a:r>
+          </a:p>
+          <a:p>
+            <a:pPr lvl="1"/>
+            <a:r>
+              <a:rPr lang="en-US" dirty="0" smtClean="0"/>
+              <a:t>Unusual syntax &amp; semantics</a:t>
+            </a:r>
+            <a:endParaRPr lang="en-US" dirty="0"/>
+          </a:p>
+        </p:txBody>
+      </p:sp>
+      <p:sp>
+        <p:nvSpPr>
+          <p:cNvPr id="5" name="Content Placeholder 4"/>
+          <p:cNvSpPr>
+            <a:spLocks noGrp="1"/>
+          </p:cNvSpPr>
+          <p:nvPr>
+            <p:ph sz="half" idx="2"/>
+          </p:nvPr>
+        </p:nvSpPr>
+        <p:spPr/>
+        <p:txBody>
+          <a:bodyPr>
+            <a:normAutofit lnSpcReduction="10000"/>
+          </a:bodyPr>
+          <a:lstStyle/>
+          <a:p>
+            <a:r>
+              <a:rPr lang="en-US" dirty="0" smtClean="0"/>
+              <a:t>Developed by Ross </a:t>
+            </a:r>
+            <a:r>
+              <a:rPr lang="en-US" dirty="0" err="1" smtClean="0"/>
+              <a:t>Ihaka</a:t>
+            </a:r>
+            <a:r>
+              <a:rPr lang="en-US" dirty="0" smtClean="0"/>
+              <a:t> and Robert Gentleman</a:t>
+            </a:r>
+          </a:p>
+          <a:p>
+            <a:r>
+              <a:rPr lang="en-US" dirty="0" smtClean="0"/>
+              <a:t>Multi-paradigm: functional programming and others</a:t>
+            </a:r>
+          </a:p>
+          <a:p>
+            <a:r>
+              <a:rPr lang="en-US" dirty="0" smtClean="0"/>
+              <a:t>Somewhat C-like syntax</a:t>
+            </a:r>
+          </a:p>
+          <a:p>
+            <a:r>
+              <a:rPr lang="en-US" dirty="0" err="1" smtClean="0"/>
+              <a:t>http://www.r-</a:t>
+            </a:r>
+            <a:r>
+              <a:rPr lang="en-US" dirty="0" err="1" smtClean="0"/>
+              <a:t>project.org</a:t>
+            </a:r>
+            <a:endParaRPr lang="en-US" dirty="0" smtClean="0"/>
+          </a:p>
+          <a:p>
+            <a:endParaRPr lang="en-US" dirty="0"/>
           </a:p>
         </p:txBody>
       </p:sp>
@@ -3674,6 +3801,13 @@
   <p:clrMapOvr>
     <a:masterClrMapping/>
   </p:clrMapOvr>
+  <p:timing>
+    <p:tnLst>
+      <p:par>
+        <p:cTn id="1" dur="indefinite" restart="never" nodeType="tmRoot"/>
+      </p:par>
+    </p:tnLst>
+  </p:timing>
 </p:sld>
 </file>
 
@@ -3727,20 +3861,98 @@
             <p:ph idx="1"/>
           </p:nvPr>
         </p:nvSpPr>
-        <p:spPr/>
-        <p:txBody>
-          <a:bodyPr/>
-          <a:lstStyle/>
-          <a:p>
-            <a:endParaRPr lang="en-US"/>
-          </a:p>
-        </p:txBody>
-      </p:sp>
+        <p:spPr>
+          <a:xfrm>
+            <a:off x="457200" y="1600201"/>
+            <a:ext cx="8229600" cy="2362200"/>
+          </a:xfrm>
+        </p:spPr>
+        <p:txBody>
+          <a:bodyPr/>
+          <a:lstStyle/>
+          <a:p>
+            <a:r>
+              <a:rPr lang="en-US" dirty="0" smtClean="0"/>
+              <a:t>Very large (~3Gb) modularized project</a:t>
+            </a:r>
+          </a:p>
+          <a:p>
+            <a:r>
+              <a:rPr lang="en-US" dirty="0" smtClean="0"/>
+              <a:t>Has specialized </a:t>
+            </a:r>
+            <a:r>
+              <a:rPr lang="en-US" dirty="0" err="1" smtClean="0"/>
+              <a:t>ShortRead</a:t>
+            </a:r>
+            <a:r>
+              <a:rPr lang="en-US" dirty="0" smtClean="0"/>
+              <a:t> library</a:t>
+            </a:r>
+          </a:p>
+          <a:p>
+            <a:r>
+              <a:rPr lang="en-US" dirty="0" smtClean="0"/>
+              <a:t>Not under OBF</a:t>
+            </a:r>
+          </a:p>
+          <a:p>
+            <a:r>
+              <a:rPr lang="en-US" dirty="0" smtClean="0"/>
+              <a:t>http</a:t>
+            </a:r>
+            <a:r>
+              <a:rPr lang="en-US" dirty="0" smtClean="0"/>
+              <a:t>://</a:t>
+            </a:r>
+            <a:r>
+              <a:rPr lang="en-US" dirty="0" err="1" smtClean="0"/>
+              <a:t>www.bioconductor.org</a:t>
+            </a:r>
+            <a:r>
+              <a:rPr lang="en-US" dirty="0" smtClean="0"/>
+              <a:t>/</a:t>
+            </a:r>
+            <a:endParaRPr lang="en-US" dirty="0"/>
+          </a:p>
+        </p:txBody>
+      </p:sp>
+      <p:pic>
+        <p:nvPicPr>
+          <p:cNvPr id="4" name="Picture 3" descr="bioconductor.gif"/>
+          <p:cNvPicPr>
+            <a:picLocks noChangeAspect="1"/>
+          </p:cNvPicPr>
+          <p:nvPr/>
+        </p:nvPicPr>
+        <p:blipFill>
+          <a:blip r:embed="rId2"/>
+          <a:stretch>
+            <a:fillRect/>
+          </a:stretch>
+        </p:blipFill>
+        <p:spPr>
+          <a:xfrm>
+            <a:off x="719670" y="4254501"/>
+            <a:ext cx="7662330" cy="2298699"/>
+          </a:xfrm>
+          <a:prstGeom prst="rect">
+            <a:avLst/>
+          </a:prstGeom>
+        </p:spPr>
+      </p:pic>
     </p:spTree>
   </p:cSld>
   <p:clrMapOvr>
     <a:masterClrMapping/>
   </p:clrMapOvr>
+  <p:timing>
+    <p:tnLst>
+      <p:par>
+        <p:cTn id="1" dur="indefinite" restart="never" nodeType="tmRoot"/>
+      </p:par>
+    </p:tnLst>
+  </p:timing>
 </p:sld>
 </file>
 
@@ -3778,7 +3990,11 @@
           <a:p>
             <a:r>
               <a:rPr lang="en-US" dirty="0" smtClean="0"/>
-              <a:t>Exercise: a simple script</a:t>
+              <a:t>Exercise:</a:t>
+            </a:r>
+            <a:r>
+              <a:rPr lang="en-US" dirty="0" smtClean="0"/>
+              <a:t> installation</a:t>
             </a:r>
             <a:endParaRPr lang="en-US" dirty="0"/>
           </a:p>
@@ -3799,7 +4015,95 @@
           <a:bodyPr/>
           <a:lstStyle/>
           <a:p>
-            <a:endParaRPr lang="en-US"/>
+            <a:pPr marL="0" indent="0">
+              <a:buNone/>
+            </a:pPr>
+            <a:r>
+              <a:rPr lang="en-US" dirty="0" smtClean="0"/>
+              <a:t>Install the latest versions of these toolkits as non-root:</a:t>
+            </a:r>
+          </a:p>
+          <a:p>
+            <a:pPr marL="514350" indent="-514350">
+              <a:buFont typeface="+mj-lt"/>
+              <a:buAutoNum type="arabicPeriod"/>
+            </a:pPr>
+            <a:r>
+              <a:rPr lang="en-US" dirty="0" smtClean="0"/>
+              <a:t>BioPerl (</a:t>
+            </a:r>
+            <a:r>
+              <a:rPr lang="en-US" dirty="0" err="1" smtClean="0"/>
+              <a:t>bioperl</a:t>
+            </a:r>
+            <a:r>
+              <a:rPr lang="en-US" dirty="0" smtClean="0"/>
+              <a:t>-live &amp; </a:t>
+            </a:r>
+            <a:r>
+              <a:rPr lang="en-US" dirty="0" err="1" smtClean="0"/>
+              <a:t>bioperl</a:t>
+            </a:r>
+            <a:r>
+              <a:rPr lang="en-US" dirty="0" smtClean="0"/>
+              <a:t>-run)</a:t>
+            </a:r>
+          </a:p>
+          <a:p>
+            <a:pPr marL="514350" indent="-514350">
+              <a:buFont typeface="+mj-lt"/>
+              <a:buAutoNum type="arabicPeriod"/>
+            </a:pPr>
+            <a:r>
+              <a:rPr lang="en-US" dirty="0" err="1" smtClean="0"/>
+              <a:t>BioPython</a:t>
+            </a:r>
+            <a:endParaRPr lang="en-US" dirty="0" smtClean="0"/>
+          </a:p>
+          <a:p>
+            <a:pPr marL="514350" indent="-514350">
+              <a:buFont typeface="+mj-lt"/>
+              <a:buAutoNum type="arabicPeriod"/>
+            </a:pPr>
+            <a:r>
+              <a:rPr lang="en-US" dirty="0" err="1" smtClean="0"/>
+              <a:t>BioRuby</a:t>
+            </a:r>
+            <a:r>
+              <a:rPr lang="en-US" dirty="0" smtClean="0"/>
+              <a:t> (</a:t>
+            </a:r>
+            <a:r>
+              <a:rPr lang="en-US" dirty="0" err="1" smtClean="0"/>
+              <a:t>bioruby-ngs</a:t>
+            </a:r>
+            <a:r>
+              <a:rPr lang="en-US" dirty="0" smtClean="0"/>
+              <a:t>)</a:t>
+            </a:r>
+          </a:p>
+          <a:p>
+            <a:pPr marL="514350" indent="-514350">
+              <a:buFont typeface="+mj-lt"/>
+              <a:buAutoNum type="arabicPeriod"/>
+            </a:pPr>
+            <a:r>
+              <a:rPr lang="en-US" dirty="0" err="1" smtClean="0"/>
+              <a:t>BioConductor</a:t>
+            </a:r>
+            <a:r>
+              <a:rPr lang="en-US" dirty="0" smtClean="0"/>
+              <a:t> (</a:t>
+            </a:r>
+            <a:r>
+              <a:rPr lang="en-US" dirty="0" err="1" smtClean="0"/>
+              <a:t>biobase</a:t>
+            </a:r>
+            <a:r>
+              <a:rPr lang="en-US" dirty="0" smtClean="0"/>
+              <a:t>)</a:t>
+            </a:r>
+            <a:endParaRPr lang="en-US" dirty="0"/>
           </a:p>
         </p:txBody>
       </p:sp>
@@ -3808,6 +4112,13 @@
   <p:clrMapOvr>
     <a:masterClrMapping/>
   </p:clrMapOvr>
+  <p:timing>
+    <p:tnLst>
+      <p:par>
+        <p:cTn id="1" dur="indefinite" restart="never" nodeType="tmRoot"/>
+      </p:par>
+    </p:tnLst>
+  </p:timing>
 </p:sld>
 </file>
 
@@ -3866,7 +4177,17 @@
           <a:bodyPr/>
           <a:lstStyle/>
           <a:p>
-            <a:endParaRPr lang="en-US"/>
+            <a:r>
+              <a:rPr lang="en-US" dirty="0" smtClean="0"/>
+              <a:t>Different from imperative programming, object-oriented programming models domain concepts (e.g. sequences, taxa) as objects with behaviors.</a:t>
+            </a:r>
+          </a:p>
+          <a:p>
+            <a:r>
+              <a:rPr lang="en-US" dirty="0" smtClean="0"/>
+              <a:t>All commonly-used toolkits in bioinformatics are object-oriented.</a:t>
+            </a:r>
+            <a:endParaRPr lang="en-US" dirty="0"/>
           </a:p>
         </p:txBody>
       </p:sp>
@@ -3875,6 +4196,13 @@
   <p:clrMapOvr>
     <a:masterClrMapping/>
   </p:clrMapOvr>
+  <p:timing>
+    <p:tnLst>
+      <p:par>
+        <p:cTn id="1" dur="indefinite" restart="never" nodeType="tmRoot"/>
+      </p:par>
+    </p:tnLst>
+  </p:timing>
 </p:sld>
 </file>
 
@@ -3907,12 +4235,14 @@
         </p:nvSpPr>
         <p:spPr/>
         <p:txBody>
-          <a:bodyPr/>
-          <a:lstStyle/>
-          <a:p>
-            <a:r>
-              <a:rPr lang="en-US" dirty="0" smtClean="0"/>
-              <a:t>Scripting languages</a:t>
+          <a:bodyPr>
+            <a:normAutofit/>
+          </a:bodyPr>
+          <a:lstStyle/>
+          <a:p>
+            <a:r>
+              <a:rPr lang="en-US" dirty="0" smtClean="0"/>
+              <a:t>Dynamic language toolkits</a:t>
             </a:r>
             <a:endParaRPr lang="en-US" dirty="0"/>
           </a:p>
@@ -3925,23 +4255,81 @@
             <a:spLocks noGrp="1"/>
           </p:cNvSpPr>
           <p:nvPr>
-            <p:ph idx="1"/>
-          </p:nvPr>
-        </p:nvSpPr>
-        <p:spPr/>
-        <p:txBody>
-          <a:bodyPr/>
-          <a:lstStyle/>
-          <a:p>
-            <a:endParaRPr lang="en-US"/>
-          </a:p>
-        </p:txBody>
-      </p:sp>
+            <p:ph sz="half" idx="1"/>
+          </p:nvPr>
+        </p:nvSpPr>
+        <p:spPr>
+          <a:xfrm>
+            <a:off x="457200" y="1600200"/>
+            <a:ext cx="4490536" cy="4525963"/>
+          </a:xfrm>
+        </p:spPr>
+        <p:txBody>
+          <a:bodyPr>
+            <a:normAutofit/>
+          </a:bodyPr>
+          <a:lstStyle/>
+          <a:p>
+            <a:r>
+              <a:rPr lang="en-US" dirty="0" smtClean="0"/>
+              <a:t>Dynamic ("scripting") languages are commonly used in bioinformatics: easy, fast development</a:t>
+            </a:r>
+          </a:p>
+          <a:p>
+            <a:r>
+              <a:rPr lang="en-US" dirty="0" smtClean="0"/>
+              <a:t>OO bioinformatics toolkits for dynamic languages supported by O|B|F</a:t>
+            </a:r>
+          </a:p>
+          <a:p>
+            <a:r>
+              <a:rPr lang="en-US" dirty="0" smtClean="0"/>
+              <a:t>Learn a scripting language and </a:t>
+            </a:r>
+            <a:r>
+              <a:rPr lang="en-US" dirty="0" smtClean="0"/>
+              <a:t>toolkit!</a:t>
+            </a:r>
+            <a:endParaRPr lang="en-US" dirty="0"/>
+          </a:p>
+        </p:txBody>
+      </p:sp>
+      <p:pic>
+        <p:nvPicPr>
+          <p:cNvPr id="5" name="Content Placeholder 4" descr="Bosc Pear.png"/>
+          <p:cNvPicPr>
+            <a:picLocks noGrp="1" noChangeAspect="1"/>
+          </p:cNvPicPr>
+          <p:nvPr>
+            <p:ph sz="half" idx="2"/>
+          </p:nvPr>
+        </p:nvPicPr>
+        <p:blipFill>
+          <a:blip r:embed="rId2"/>
+          <a:srcRect l="3644" b="22677"/>
+          <a:stretch>
+            <a:fillRect/>
+          </a:stretch>
+        </p:blipFill>
+        <p:spPr>
+          <a:xfrm>
+            <a:off x="4947736" y="1916564"/>
+            <a:ext cx="3891464" cy="3010379"/>
+          </a:xfrm>
+        </p:spPr>
+      </p:pic>
     </p:spTree>
   </p:cSld>
   <p:clrMapOvr>
     <a:masterClrMapping/>
   </p:clrMapOvr>
+  <p:timing>
+    <p:tnLst>
+      <p:par>
+        <p:cTn id="1" dur="indefinite" restart="never" nodeType="tmRoot"/>
+      </p:par>
+    </p:tnLst>
+  </p:timing>
 </p:sld>
 </file>
 
@@ -3992,15 +4380,122 @@
             <a:spLocks noGrp="1"/>
           </p:cNvSpPr>
           <p:nvPr>
-            <p:ph idx="1"/>
-          </p:nvPr>
-        </p:nvSpPr>
-        <p:spPr/>
-        <p:txBody>
-          <a:bodyPr/>
-          <a:lstStyle/>
-          <a:p>
-            <a:endParaRPr lang="en-US"/>
+            <p:ph sz="half" idx="1"/>
+          </p:nvPr>
+        </p:nvSpPr>
+        <p:spPr/>
+        <p:txBody>
+          <a:bodyPr/>
+          <a:lstStyle/>
+          <a:p>
+            <a:r>
+              <a:rPr lang="en-US" dirty="0" smtClean="0"/>
+              <a:t>Pro:</a:t>
+            </a:r>
+          </a:p>
+          <a:p>
+            <a:pPr lvl="1"/>
+            <a:r>
+              <a:rPr lang="en-US" dirty="0" smtClean="0"/>
+              <a:t>Large code base (CPAN)</a:t>
+            </a:r>
+          </a:p>
+          <a:p>
+            <a:pPr lvl="1"/>
+            <a:r>
+              <a:rPr lang="en-US" dirty="0" smtClean="0"/>
+              <a:t>Fast</a:t>
+            </a:r>
+            <a:endParaRPr lang="en-US" dirty="0" smtClean="0"/>
+          </a:p>
+          <a:p>
+            <a:pPr lvl="1"/>
+            <a:r>
+              <a:rPr lang="en-US" dirty="0" smtClean="0"/>
+              <a:t>Ubiquitous </a:t>
+            </a:r>
+          </a:p>
+          <a:p>
+            <a:r>
+              <a:rPr lang="en-US" dirty="0" smtClean="0"/>
+              <a:t>Con:</a:t>
+            </a:r>
+          </a:p>
+          <a:p>
+            <a:pPr lvl="1"/>
+            <a:r>
+              <a:rPr lang="en-US" dirty="0" smtClean="0"/>
+              <a:t>Difficult syntax</a:t>
+            </a:r>
+          </a:p>
+          <a:p>
+            <a:pPr lvl="1"/>
+            <a:r>
+              <a:rPr lang="en-US" dirty="0" smtClean="0"/>
+              <a:t>Delayed version 6</a:t>
+            </a:r>
+          </a:p>
+          <a:p>
+            <a:pPr lvl="1"/>
+            <a:r>
+              <a:rPr lang="en-US" dirty="0" smtClean="0"/>
+              <a:t>Losing momentum</a:t>
+            </a:r>
+            <a:endParaRPr lang="en-US" dirty="0"/>
+          </a:p>
+        </p:txBody>
+      </p:sp>
+      <p:sp>
+        <p:nvSpPr>
+          <p:cNvPr id="4" name="Content Placeholder 3"/>
+          <p:cNvSpPr>
+            <a:spLocks noGrp="1"/>
+          </p:cNvSpPr>
+          <p:nvPr>
+            <p:ph sz="half" idx="2"/>
+          </p:nvPr>
+        </p:nvSpPr>
+        <p:spPr/>
+        <p:txBody>
+          <a:bodyPr/>
+          <a:lstStyle/>
+          <a:p>
+            <a:r>
+              <a:rPr lang="en-US" dirty="0" smtClean="0"/>
+              <a:t>Developed by Larry Wall</a:t>
+            </a:r>
+          </a:p>
+          <a:p>
+            <a:r>
+              <a:rPr lang="en-US" dirty="0" smtClean="0"/>
+              <a:t>Object-orientation added in v.5</a:t>
+            </a:r>
+          </a:p>
+          <a:p>
+            <a:r>
+              <a:rPr lang="en-US" dirty="0" smtClean="0"/>
+              <a:t>C-like syntax</a:t>
+            </a:r>
+          </a:p>
+          <a:p>
+            <a:r>
+              <a:rPr lang="en-US" dirty="0" smtClean="0"/>
+              <a:t>Uses non-alphanumeric characters extensively</a:t>
+            </a:r>
+          </a:p>
+          <a:p>
+            <a:r>
+              <a:rPr lang="en-US" dirty="0" smtClean="0"/>
+              <a:t>http://</a:t>
+            </a:r>
+            <a:r>
+              <a:rPr lang="en-US" dirty="0" err="1" smtClean="0"/>
+              <a:t>www.perl.org</a:t>
+            </a:r>
+            <a:r>
+              <a:rPr lang="en-US" dirty="0" smtClean="0"/>
+              <a:t> </a:t>
+            </a:r>
           </a:p>
         </p:txBody>
       </p:sp>
@@ -4009,6 +4504,13 @@
   <p:clrMapOvr>
     <a:masterClrMapping/>
   </p:clrMapOvr>
+  <p:timing>
+    <p:tnLst>
+      <p:par>
+        <p:cTn id="1" dur="indefinite" restart="never" nodeType="tmRoot"/>
+      </p:par>
+    </p:tnLst>
+  </p:timing>
 </p:sld>
 </file>
 
@@ -4054,28 +4556,162 @@
       </p:sp>
       <p:sp>
         <p:nvSpPr>
-          <p:cNvPr id="3" name="Content Placeholder 2"/>
-          <p:cNvSpPr>
-            <a:spLocks noGrp="1"/>
-          </p:cNvSpPr>
-          <p:nvPr>
-            <p:ph idx="1"/>
-          </p:nvPr>
-        </p:nvSpPr>
-        <p:spPr/>
-        <p:txBody>
-          <a:bodyPr/>
-          <a:lstStyle/>
-          <a:p>
-            <a:endParaRPr lang="en-US"/>
-          </a:p>
-        </p:txBody>
-      </p:sp>
+          <p:cNvPr id="4" name="Content Placeholder 3"/>
+          <p:cNvSpPr>
+            <a:spLocks noGrp="1"/>
+          </p:cNvSpPr>
+          <p:nvPr>
+            <p:ph sz="half" idx="1"/>
+          </p:nvPr>
+        </p:nvSpPr>
+        <p:spPr/>
+        <p:txBody>
+          <a:bodyPr>
+            <a:normAutofit/>
+          </a:bodyPr>
+          <a:lstStyle/>
+          <a:p>
+            <a:r>
+              <a:rPr lang="en-US" sz="2400" dirty="0" smtClean="0"/>
+              <a:t>Modularized toolkit: </a:t>
+            </a:r>
+            <a:r>
+              <a:rPr lang="en-US" sz="2400" dirty="0" err="1" smtClean="0"/>
+              <a:t>bioperl</a:t>
+            </a:r>
+            <a:r>
+              <a:rPr lang="en-US" sz="2400" dirty="0" smtClean="0"/>
+              <a:t>-live, </a:t>
+            </a:r>
+            <a:r>
+              <a:rPr lang="en-US" sz="2400" dirty="0" err="1" smtClean="0"/>
+              <a:t>bioperl</a:t>
+            </a:r>
+            <a:r>
+              <a:rPr lang="en-US" sz="2400" dirty="0" smtClean="0"/>
+              <a:t>-run, etc.</a:t>
+            </a:r>
+          </a:p>
+          <a:p>
+            <a:r>
+              <a:rPr lang="en-US" sz="2400" dirty="0" smtClean="0"/>
+              <a:t>http://</a:t>
+            </a:r>
+            <a:r>
+              <a:rPr lang="en-US" sz="2400" dirty="0" err="1" smtClean="0"/>
+              <a:t>www.bioperl.org</a:t>
+            </a:r>
+            <a:endParaRPr lang="en-US" sz="2400" dirty="0" smtClean="0"/>
+          </a:p>
+          <a:p>
+            <a:r>
+              <a:rPr lang="en-US" sz="2400" dirty="0" smtClean="0"/>
+              <a:t>http://</a:t>
+            </a:r>
+            <a:r>
+              <a:rPr lang="en-US" sz="2400" dirty="0" err="1" smtClean="0"/>
+              <a:t>github.com/bioperl</a:t>
+            </a:r>
+            <a:endParaRPr lang="en-US" sz="2400" dirty="0" smtClean="0"/>
+          </a:p>
+          <a:p>
+            <a:r>
+              <a:rPr lang="en-US" sz="2400" dirty="0" smtClean="0"/>
+              <a:t>NGS capabilities:</a:t>
+            </a:r>
+          </a:p>
+          <a:p>
+            <a:pPr lvl="1"/>
+            <a:r>
+              <a:rPr lang="en-US" sz="2000" dirty="0" smtClean="0"/>
+              <a:t>I/O for read and alignment formats (</a:t>
+            </a:r>
+            <a:r>
+              <a:rPr lang="en-US" sz="2000" dirty="0" err="1" smtClean="0"/>
+              <a:t>fastq</a:t>
+            </a:r>
+            <a:r>
+              <a:rPr lang="en-US" sz="2000" dirty="0" smtClean="0"/>
+              <a:t> like </a:t>
+            </a:r>
+            <a:r>
+              <a:rPr lang="en-US" sz="2000" dirty="0" err="1" smtClean="0"/>
+              <a:t>biopython</a:t>
+            </a:r>
+            <a:r>
+              <a:rPr lang="en-US" sz="2000" dirty="0" smtClean="0"/>
+              <a:t>)</a:t>
+            </a:r>
+          </a:p>
+          <a:p>
+            <a:pPr lvl="1"/>
+            <a:r>
+              <a:rPr lang="en-US" sz="2000" dirty="0" smtClean="0"/>
+              <a:t>wrappers for </a:t>
+            </a:r>
+            <a:r>
+              <a:rPr lang="en-US" sz="2000" dirty="0" err="1" smtClean="0"/>
+              <a:t>maq</a:t>
+            </a:r>
+            <a:r>
+              <a:rPr lang="en-US" sz="2000" dirty="0" smtClean="0"/>
+              <a:t>, </a:t>
+            </a:r>
+            <a:r>
+              <a:rPr lang="en-US" sz="2000" dirty="0" err="1" smtClean="0"/>
+              <a:t>samtools</a:t>
+            </a:r>
+            <a:r>
+              <a:rPr lang="en-US" sz="2000" dirty="0" smtClean="0"/>
+              <a:t>, </a:t>
+            </a:r>
+            <a:r>
+              <a:rPr lang="en-US" sz="2000" dirty="0" err="1" smtClean="0"/>
+              <a:t>bwa</a:t>
+            </a:r>
+            <a:r>
+              <a:rPr lang="en-US" sz="2000" dirty="0" smtClean="0"/>
+              <a:t>, bowtie, </a:t>
+            </a:r>
+            <a:r>
+              <a:rPr lang="en-US" sz="2000" dirty="0" err="1" smtClean="0"/>
+              <a:t>newbler</a:t>
+            </a:r>
+            <a:endParaRPr lang="en-US" sz="2000" dirty="0"/>
+          </a:p>
+        </p:txBody>
+      </p:sp>
+      <p:pic>
+        <p:nvPicPr>
+          <p:cNvPr id="6" name="Content Placeholder 5" descr="bioperl.png"/>
+          <p:cNvPicPr>
+            <a:picLocks noGrp="1" noChangeAspect="1"/>
+          </p:cNvPicPr>
+          <p:nvPr>
+            <p:ph sz="half" idx="2"/>
+          </p:nvPr>
+        </p:nvPicPr>
+        <p:blipFill>
+          <a:blip r:embed="rId2"/>
+          <a:srcRect t="-6034" b="-6034"/>
+          <a:stretch>
+            <a:fillRect/>
+          </a:stretch>
+        </p:blipFill>
+        <p:spPr/>
+      </p:pic>
     </p:spTree>
   </p:cSld>
   <p:clrMapOvr>
     <a:masterClrMapping/>
   </p:clrMapOvr>
+  <p:timing>
+    <p:tnLst>
+      <p:par>
+        <p:cTn id="1" dur="indefinite" restart="never" nodeType="tmRoot"/>
+      </p:par>
+    </p:tnLst>
+  </p:timing>
 </p:sld>
 </file>
 
@@ -4121,20 +4757,134 @@
       </p:sp>
       <p:sp>
         <p:nvSpPr>
-          <p:cNvPr id="3" name="Content Placeholder 2"/>
-          <p:cNvSpPr>
-            <a:spLocks noGrp="1"/>
-          </p:cNvSpPr>
-          <p:nvPr>
-            <p:ph idx="1"/>
-          </p:nvPr>
-        </p:nvSpPr>
-        <p:spPr/>
-        <p:txBody>
-          <a:bodyPr/>
-          <a:lstStyle/>
-          <a:p>
-            <a:endParaRPr lang="en-US"/>
+          <p:cNvPr id="4" name="Content Placeholder 3"/>
+          <p:cNvSpPr>
+            <a:spLocks noGrp="1"/>
+          </p:cNvSpPr>
+          <p:nvPr>
+            <p:ph sz="half" idx="1"/>
+          </p:nvPr>
+        </p:nvSpPr>
+        <p:spPr/>
+        <p:txBody>
+          <a:bodyPr/>
+          <a:lstStyle/>
+          <a:p>
+            <a:r>
+              <a:rPr lang="en-US" dirty="0" smtClean="0"/>
+              <a:t>Pro:</a:t>
+            </a:r>
+          </a:p>
+          <a:p>
+            <a:pPr lvl="1"/>
+            <a:r>
+              <a:rPr lang="en-US" dirty="0" smtClean="0"/>
+              <a:t>Clean syntax</a:t>
+            </a:r>
+          </a:p>
+          <a:p>
+            <a:pPr lvl="1"/>
+            <a:r>
+              <a:rPr lang="en-US" dirty="0" smtClean="0"/>
+              <a:t>Intuitive OO</a:t>
+            </a:r>
+          </a:p>
+          <a:p>
+            <a:pPr lvl="1"/>
+            <a:r>
+              <a:rPr lang="en-US" dirty="0" smtClean="0"/>
+              <a:t>Growing momentum</a:t>
+            </a:r>
+          </a:p>
+          <a:p>
+            <a:r>
+              <a:rPr lang="en-US" dirty="0" smtClean="0"/>
+              <a:t>Con:</a:t>
+            </a:r>
+          </a:p>
+          <a:p>
+            <a:pPr lvl="1"/>
+            <a:r>
+              <a:rPr lang="en-US" dirty="0" smtClean="0"/>
+              <a:t>2 </a:t>
+            </a:r>
+            <a:r>
+              <a:rPr lang="en-US" dirty="0" err="1" smtClean="0"/>
+              <a:t>vs</a:t>
+            </a:r>
+            <a:r>
+              <a:rPr lang="en-US" dirty="0" smtClean="0"/>
+              <a:t> 3?</a:t>
+            </a:r>
+          </a:p>
+          <a:p>
+            <a:pPr lvl="1"/>
+            <a:r>
+              <a:rPr lang="en-US" dirty="0" smtClean="0"/>
+              <a:t>Semantic indentation</a:t>
+            </a:r>
+          </a:p>
+          <a:p>
+            <a:pPr lvl="1"/>
+            <a:r>
+              <a:rPr lang="en-US" dirty="0" smtClean="0"/>
+              <a:t>No CPAN</a:t>
+            </a:r>
+            <a:endParaRPr lang="en-US" dirty="0"/>
+          </a:p>
+        </p:txBody>
+      </p:sp>
+      <p:sp>
+        <p:nvSpPr>
+          <p:cNvPr id="5" name="Content Placeholder 4"/>
+          <p:cNvSpPr>
+            <a:spLocks noGrp="1"/>
+          </p:cNvSpPr>
+          <p:nvPr>
+            <p:ph sz="half" idx="2"/>
+          </p:nvPr>
+        </p:nvSpPr>
+        <p:spPr/>
+        <p:txBody>
+          <a:bodyPr/>
+          <a:lstStyle/>
+          <a:p>
+            <a:r>
+              <a:rPr lang="en-US" dirty="0" smtClean="0"/>
+              <a:t>Developed by Guido van </a:t>
+            </a:r>
+            <a:r>
+              <a:rPr lang="en-US" dirty="0" err="1" smtClean="0"/>
+              <a:t>Rossum</a:t>
+            </a:r>
+            <a:endParaRPr lang="en-US" dirty="0" smtClean="0"/>
+          </a:p>
+          <a:p>
+            <a:r>
+              <a:rPr lang="en-US" dirty="0" smtClean="0"/>
+              <a:t>Multi-paradigm imperative, OO and functional programming</a:t>
+            </a:r>
+          </a:p>
+          <a:p>
+            <a:r>
+              <a:rPr lang="en-US" dirty="0" smtClean="0"/>
+              <a:t>Blocks indicated by indentation</a:t>
+            </a:r>
+          </a:p>
+          <a:p>
+            <a:r>
+              <a:rPr lang="en-US" dirty="0" smtClean="0"/>
+              <a:t>http://</a:t>
+            </a:r>
+            <a:r>
+              <a:rPr lang="en-US" dirty="0" err="1" smtClean="0"/>
+              <a:t>www.python.org</a:t>
+            </a:r>
+            <a:r>
+              <a:rPr lang="en-US" dirty="0" smtClean="0"/>
+              <a:t> </a:t>
+            </a:r>
+            <a:endParaRPr lang="en-US" dirty="0"/>
           </a:p>
         </p:txBody>
       </p:sp>
@@ -4143,6 +4893,13 @@
   <p:clrMapOvr>
     <a:masterClrMapping/>
   </p:clrMapOvr>
+  <p:timing>
+    <p:tnLst>
+      <p:par>
+        <p:cTn id="1" dur="indefinite" restart="never" nodeType="tmRoot"/>
+      </p:par>
+    </p:tnLst>
+  </p:timing>
 </p:sld>
 </file>
 
@@ -4188,7 +4945,7 @@
       </p:sp>
       <p:sp>
         <p:nvSpPr>
-          <p:cNvPr id="3" name="Content Placeholder 2"/>
+          <p:cNvPr id="6" name="Content Placeholder 5"/>
           <p:cNvSpPr>
             <a:spLocks noGrp="1"/>
           </p:cNvSpPr>
@@ -4196,20 +4953,117 @@
             <p:ph idx="1"/>
           </p:nvPr>
         </p:nvSpPr>
-        <p:spPr/>
-        <p:txBody>
-          <a:bodyPr/>
-          <a:lstStyle/>
-          <a:p>
-            <a:endParaRPr lang="en-US"/>
-          </a:p>
-        </p:txBody>
-      </p:sp>
+        <p:spPr>
+          <a:xfrm>
+            <a:off x="457200" y="1600200"/>
+            <a:ext cx="8229600" cy="2748049"/>
+          </a:xfrm>
+        </p:spPr>
+        <p:txBody>
+          <a:bodyPr>
+            <a:normAutofit/>
+          </a:bodyPr>
+          <a:lstStyle/>
+          <a:p>
+            <a:r>
+              <a:rPr lang="en-US" sz="2800" dirty="0" smtClean="0"/>
+              <a:t>Smaller, less modularized than BioPerl</a:t>
+            </a:r>
+          </a:p>
+          <a:p>
+            <a:r>
+              <a:rPr lang="en-US" sz="2800" dirty="0" smtClean="0"/>
+              <a:t>http</a:t>
+            </a:r>
+            <a:r>
+              <a:rPr lang="en-US" sz="2800" dirty="0" smtClean="0"/>
+              <a:t>://</a:t>
+            </a:r>
+            <a:r>
+              <a:rPr lang="en-US" sz="2800" dirty="0" err="1" smtClean="0"/>
+              <a:t>biopython.org</a:t>
+            </a:r>
+            <a:r>
+              <a:rPr lang="en-US" sz="2800" dirty="0" smtClean="0"/>
+              <a:t>, https</a:t>
+            </a:r>
+            <a:r>
+              <a:rPr lang="en-US" sz="2800" dirty="0" smtClean="0"/>
+              <a:t>://</a:t>
+            </a:r>
+            <a:r>
+              <a:rPr lang="en-US" sz="2800" dirty="0" err="1" smtClean="0"/>
+              <a:t>github.com/</a:t>
+            </a:r>
+            <a:r>
+              <a:rPr lang="en-US" sz="2800" dirty="0" err="1" smtClean="0"/>
+              <a:t>biopython</a:t>
+            </a:r>
+            <a:endParaRPr lang="en-US" sz="2800" dirty="0" smtClean="0"/>
+          </a:p>
+          <a:p>
+            <a:r>
+              <a:rPr lang="en-US" sz="2800" dirty="0" smtClean="0"/>
+              <a:t>NGS capabilities:</a:t>
+            </a:r>
+          </a:p>
+          <a:p>
+            <a:pPr lvl="1"/>
+            <a:r>
+              <a:rPr lang="en-US" sz="2400" dirty="0" smtClean="0"/>
+              <a:t>I/O for short read formats</a:t>
+            </a:r>
+          </a:p>
+          <a:p>
+            <a:pPr lvl="1"/>
+            <a:r>
+              <a:rPr lang="en-US" sz="2400" dirty="0" smtClean="0"/>
+              <a:t>For wrappers: see Galaxy</a:t>
+            </a:r>
+          </a:p>
+          <a:p>
+            <a:pPr lvl="1"/>
+            <a:endParaRPr lang="en-US" sz="2400" dirty="0"/>
+          </a:p>
+        </p:txBody>
+      </p:sp>
+      <p:pic>
+        <p:nvPicPr>
+          <p:cNvPr id="8" name="Picture 7" descr="biopython.jpeg"/>
+          <p:cNvPicPr>
+            <a:picLocks noChangeAspect="1"/>
+          </p:cNvPicPr>
+          <p:nvPr/>
+        </p:nvPicPr>
+        <p:blipFill>
+          <a:blip r:embed="rId2"/>
+          <a:srcRect t="30709" b="28346"/>
+          <a:stretch>
+            <a:fillRect/>
+          </a:stretch>
+        </p:blipFill>
+        <p:spPr>
+          <a:xfrm>
+            <a:off x="1066800" y="4267200"/>
+            <a:ext cx="7010400" cy="2152756"/>
+          </a:xfrm>
+          <a:prstGeom prst="rect">
+            <a:avLst/>
+          </a:prstGeom>
+        </p:spPr>
+      </p:pic>
     </p:spTree>
   </p:cSld>
   <p:clrMapOvr>
     <a:masterClrMapping/>
   </p:clrMapOvr>
+  <p:timing>
+    <p:tnLst>
+      <p:par>
+        <p:cTn id="1" dur="indefinite" restart="never" nodeType="tmRoot"/>
+      </p:par>
+    </p:tnLst>
+  </p:timing>
 </p:sld>
 </file>
 
@@ -4255,20 +5109,132 @@
       </p:sp>
       <p:sp>
         <p:nvSpPr>
-          <p:cNvPr id="3" name="Content Placeholder 2"/>
-          <p:cNvSpPr>
-            <a:spLocks noGrp="1"/>
-          </p:cNvSpPr>
-          <p:nvPr>
-            <p:ph idx="1"/>
-          </p:nvPr>
-        </p:nvSpPr>
-        <p:spPr/>
-        <p:txBody>
-          <a:bodyPr/>
-          <a:lstStyle/>
-          <a:p>
-            <a:endParaRPr lang="en-US"/>
+          <p:cNvPr id="4" name="Content Placeholder 3"/>
+          <p:cNvSpPr>
+            <a:spLocks noGrp="1"/>
+          </p:cNvSpPr>
+          <p:nvPr>
+            <p:ph sz="half" idx="1"/>
+          </p:nvPr>
+        </p:nvSpPr>
+        <p:spPr/>
+        <p:txBody>
+          <a:bodyPr/>
+          <a:lstStyle/>
+          <a:p>
+            <a:r>
+              <a:rPr lang="en-US" dirty="0" smtClean="0"/>
+              <a:t>Pro:</a:t>
+            </a:r>
+          </a:p>
+          <a:p>
+            <a:pPr lvl="1"/>
+            <a:r>
+              <a:rPr lang="en-US" dirty="0" smtClean="0"/>
+              <a:t>Clean syntax</a:t>
+            </a:r>
+          </a:p>
+          <a:p>
+            <a:pPr lvl="1"/>
+            <a:r>
+              <a:rPr lang="en-US" dirty="0" smtClean="0"/>
+              <a:t>Objects throughout</a:t>
+            </a:r>
+          </a:p>
+          <a:p>
+            <a:pPr lvl="1"/>
+            <a:r>
+              <a:rPr lang="en-US" dirty="0" smtClean="0"/>
+              <a:t>Gem packages</a:t>
+            </a:r>
+          </a:p>
+          <a:p>
+            <a:r>
+              <a:rPr lang="en-US" dirty="0" smtClean="0"/>
+              <a:t>Con:</a:t>
+            </a:r>
+          </a:p>
+          <a:p>
+            <a:pPr lvl="1"/>
+            <a:r>
+              <a:rPr lang="en-US" dirty="0" smtClean="0"/>
+              <a:t>Smaller (Japanese) user base</a:t>
+            </a:r>
+          </a:p>
+          <a:p>
+            <a:pPr lvl="1"/>
+            <a:r>
+              <a:rPr lang="en-US" dirty="0" smtClean="0"/>
+              <a:t>Not installed everywhere</a:t>
+            </a:r>
+          </a:p>
+          <a:p>
+            <a:pPr lvl="1"/>
+            <a:r>
+              <a:rPr lang="en-US" dirty="0" smtClean="0"/>
+              <a:t>Somewhat slow</a:t>
+            </a:r>
+            <a:endParaRPr lang="en-US" dirty="0"/>
+          </a:p>
+        </p:txBody>
+      </p:sp>
+      <p:sp>
+        <p:nvSpPr>
+          <p:cNvPr id="5" name="Content Placeholder 4"/>
+          <p:cNvSpPr>
+            <a:spLocks noGrp="1"/>
+          </p:cNvSpPr>
+          <p:nvPr>
+            <p:ph sz="half" idx="2"/>
+          </p:nvPr>
+        </p:nvSpPr>
+        <p:spPr/>
+        <p:txBody>
+          <a:bodyPr/>
+          <a:lstStyle/>
+          <a:p>
+            <a:r>
+              <a:rPr lang="en-US" dirty="0" smtClean="0"/>
+              <a:t>Developed by Yukihiro "</a:t>
+            </a:r>
+            <a:r>
+              <a:rPr lang="en-US" dirty="0" err="1" smtClean="0"/>
+              <a:t>Matz</a:t>
+            </a:r>
+            <a:r>
+              <a:rPr lang="en-US" dirty="0" smtClean="0"/>
+              <a:t>" </a:t>
+            </a:r>
+            <a:r>
+              <a:rPr lang="en-US" dirty="0" smtClean="0"/>
+              <a:t>Matsumoto</a:t>
+            </a:r>
+          </a:p>
+          <a:p>
+            <a:r>
+              <a:rPr lang="en-US" dirty="0" smtClean="0"/>
+              <a:t>Consistently object oriented</a:t>
+            </a:r>
+          </a:p>
+          <a:p>
+            <a:r>
+              <a:rPr lang="en-US" dirty="0" smtClean="0"/>
+              <a:t>Python-like syntax</a:t>
+            </a:r>
+          </a:p>
+          <a:p>
+            <a:r>
+              <a:rPr lang="en-US" dirty="0" err="1" smtClean="0"/>
+              <a:t>http://www.ruby-</a:t>
+            </a:r>
+            <a:r>
+              <a:rPr lang="en-US" dirty="0" err="1" smtClean="0"/>
+              <a:t>lang.org</a:t>
+            </a:r>
+            <a:endParaRPr lang="en-US" dirty="0" smtClean="0"/>
+          </a:p>
+          <a:p>
+            <a:endParaRPr lang="en-US" dirty="0"/>
           </a:p>
         </p:txBody>
       </p:sp>
@@ -4277,6 +5243,13 @@
   <p:clrMapOvr>
     <a:masterClrMapping/>
   </p:clrMapOvr>
+  <p:timing>
+    <p:tnLst>
+      <p:par>
+        <p:cTn id="1" dur="indefinite" restart="never" nodeType="tmRoot"/>
+      </p:par>
+    </p:tnLst>
+  </p:timing>
 </p:sld>
 </file>
 
@@ -4322,28 +5295,169 @@
       </p:sp>
       <p:sp>
         <p:nvSpPr>
-          <p:cNvPr id="3" name="Content Placeholder 2"/>
-          <p:cNvSpPr>
-            <a:spLocks noGrp="1"/>
-          </p:cNvSpPr>
-          <p:nvPr>
-            <p:ph idx="1"/>
-          </p:nvPr>
-        </p:nvSpPr>
-        <p:spPr/>
-        <p:txBody>
-          <a:bodyPr/>
-          <a:lstStyle/>
-          <a:p>
-            <a:endParaRPr lang="en-US"/>
-          </a:p>
-        </p:txBody>
-      </p:sp>
+          <p:cNvPr id="4" name="Content Placeholder 3"/>
+          <p:cNvSpPr>
+            <a:spLocks noGrp="1"/>
+          </p:cNvSpPr>
+          <p:nvPr>
+            <p:ph sz="half" idx="1"/>
+          </p:nvPr>
+        </p:nvSpPr>
+        <p:spPr>
+          <a:xfrm>
+            <a:off x="457200" y="1600200"/>
+            <a:ext cx="5105400" cy="4525963"/>
+          </a:xfrm>
+        </p:spPr>
+        <p:txBody>
+          <a:bodyPr/>
+          <a:lstStyle/>
+          <a:p>
+            <a:r>
+              <a:rPr lang="en-US" dirty="0" smtClean="0"/>
+              <a:t>Modularized toolkit with </a:t>
+            </a:r>
+            <a:r>
+              <a:rPr lang="en-US" dirty="0" err="1" smtClean="0"/>
+              <a:t>biogem</a:t>
+            </a:r>
+            <a:r>
+              <a:rPr lang="en-US" dirty="0" smtClean="0"/>
+              <a:t> package manager</a:t>
+            </a:r>
+          </a:p>
+          <a:p>
+            <a:r>
+              <a:rPr lang="en-US" dirty="0" smtClean="0"/>
+              <a:t>http://</a:t>
+            </a:r>
+            <a:r>
+              <a:rPr lang="en-US" dirty="0" err="1" smtClean="0"/>
+              <a:t>bioruby.org</a:t>
+            </a:r>
+            <a:r>
+              <a:rPr lang="en-US" dirty="0" smtClean="0"/>
+              <a:t>/</a:t>
+            </a:r>
+          </a:p>
+          <a:p>
+            <a:r>
+              <a:rPr lang="en-US" dirty="0" smtClean="0"/>
+              <a:t>https://</a:t>
+            </a:r>
+            <a:r>
+              <a:rPr lang="en-US" dirty="0" err="1" smtClean="0"/>
+              <a:t>github.com/</a:t>
+            </a:r>
+            <a:r>
+              <a:rPr lang="en-US" dirty="0" err="1" smtClean="0"/>
+              <a:t>bioruby</a:t>
+            </a:r>
+            <a:endParaRPr lang="en-US" dirty="0" smtClean="0"/>
+          </a:p>
+          <a:p>
+            <a:r>
+              <a:rPr lang="en-US" dirty="0" smtClean="0"/>
+              <a:t>NGS capabilities:</a:t>
+            </a:r>
+          </a:p>
+          <a:p>
+            <a:pPr lvl="1"/>
+            <a:r>
+              <a:rPr lang="en-US" sz="2000" dirty="0" err="1" smtClean="0"/>
+              <a:t>https://github.com/helios/bioruby-</a:t>
+            </a:r>
+            <a:r>
+              <a:rPr lang="en-US" sz="2000" dirty="0" err="1" smtClean="0"/>
+              <a:t>ngs</a:t>
+            </a:r>
+            <a:endParaRPr lang="en-US" sz="2000" dirty="0" smtClean="0"/>
+          </a:p>
+          <a:p>
+            <a:pPr lvl="1"/>
+            <a:r>
+              <a:rPr lang="en-US" sz="2000" dirty="0" smtClean="0"/>
+              <a:t>I/O for common read and alignment formats</a:t>
+            </a:r>
+          </a:p>
+          <a:p>
+            <a:pPr lvl="1"/>
+            <a:r>
+              <a:rPr lang="en-US" sz="2000" dirty="0" smtClean="0"/>
+              <a:t>Wrappers for </a:t>
+            </a:r>
+            <a:r>
+              <a:rPr lang="en-US" sz="2000" dirty="0" err="1" smtClean="0"/>
+              <a:t>samtools</a:t>
+            </a:r>
+            <a:r>
+              <a:rPr lang="en-US" sz="2000" dirty="0" smtClean="0"/>
+              <a:t>, </a:t>
+            </a:r>
+            <a:r>
+              <a:rPr lang="en-US" sz="2000" dirty="0" err="1" smtClean="0"/>
+              <a:t>bwa</a:t>
+            </a:r>
+            <a:r>
+              <a:rPr lang="en-US" sz="2000" dirty="0" smtClean="0"/>
+              <a:t>, bowtie, </a:t>
+            </a:r>
+            <a:r>
+              <a:rPr lang="en-US" sz="2000" dirty="0" err="1" smtClean="0"/>
+              <a:t>tophat</a:t>
+            </a:r>
+            <a:r>
+              <a:rPr lang="en-US" sz="2000" dirty="0" smtClean="0"/>
+              <a:t>, cufflinks</a:t>
+            </a:r>
+          </a:p>
+          <a:p>
+            <a:endParaRPr lang="en-US" dirty="0" smtClean="0"/>
+          </a:p>
+          <a:p>
+            <a:endParaRPr lang="en-US" dirty="0" smtClean="0"/>
+          </a:p>
+          <a:p>
+            <a:endParaRPr lang="en-US" dirty="0"/>
+          </a:p>
+        </p:txBody>
+      </p:sp>
+      <p:pic>
+        <p:nvPicPr>
+          <p:cNvPr id="6" name="Content Placeholder 5" descr="bioruby.png"/>
+          <p:cNvPicPr>
+            <a:picLocks noGrp="1" noChangeAspect="1"/>
+          </p:cNvPicPr>
+          <p:nvPr>
+            <p:ph sz="half" idx="2"/>
+          </p:nvPr>
+        </p:nvPicPr>
+        <p:blipFill>
+          <a:blip r:embed="rId2"/>
+          <a:srcRect l="9708" t="-6034" r="9708" b="-6034"/>
+          <a:stretch>
+            <a:fillRect/>
+          </a:stretch>
+        </p:blipFill>
+        <p:spPr>
+          <a:xfrm>
+            <a:off x="5562600" y="1600200"/>
+            <a:ext cx="3254484" cy="4525963"/>
+          </a:xfrm>
+        </p:spPr>
+      </p:pic>
     </p:spTree>
   </p:cSld>
   <p:clrMapOvr>
     <a:masterClrMapping/>
   </p:clrMapOvr>
+  <p:timing>
+    <p:tnLst>
+      <p:par>
+        <p:cTn id="1" dur="indefinite" restart="never" nodeType="tmRoot"/>
+      </p:par>
+    </p:tnLst>
+  </p:timing>
 </p:sld>
 </file>
 

</xml_diff>

<commit_message>
will cover CLIScripting and Toolkits in one session
</commit_message>
<xml_diff>
--- a/doc/slides/day2/session2/Toolkits.pptx
+++ b/doc/slides/day2/session2/Toolkits.pptx
@@ -204,7 +204,7 @@
             <a:fld id="{49F2750B-51CC-9342-BA42-3CEC006D4BEE}" type="datetimeFigureOut">
               <a:rPr lang="en-US" smtClean="0"/>
               <a:pPr/>
-              <a:t>9/4/12</a:t>
+              <a:t>9/7/12</a:t>
             </a:fld>
             <a:endParaRPr lang="en-US"/>
           </a:p>
@@ -562,11 +562,7 @@
             </a:r>
             <a:r>
               <a:rPr lang="en-US" baseline="0" dirty="0" smtClean="0"/>
-              <a:t>. Exercise:</a:t>
-            </a:r>
-            <a:r>
-              <a:rPr lang="en-US" baseline="0" dirty="0" smtClean="0"/>
-              <a:t> install as non-root</a:t>
+              <a:t>. Exercise: install as non-root</a:t>
             </a:r>
             <a:endParaRPr lang="en-US" dirty="0"/>
           </a:p>
@@ -786,7 +782,7 @@
             <a:fld id="{8B6559E1-F047-C244-B3F0-03E07E42B642}" type="datetimeFigureOut">
               <a:rPr lang="en-US" smtClean="0"/>
               <a:pPr/>
-              <a:t>9/4/12</a:t>
+              <a:t>9/7/12</a:t>
             </a:fld>
             <a:endParaRPr lang="en-US"/>
           </a:p>
@@ -953,7 +949,7 @@
             <a:fld id="{8B6559E1-F047-C244-B3F0-03E07E42B642}" type="datetimeFigureOut">
               <a:rPr lang="en-US" smtClean="0"/>
               <a:pPr/>
-              <a:t>9/4/12</a:t>
+              <a:t>9/7/12</a:t>
             </a:fld>
             <a:endParaRPr lang="en-US"/>
           </a:p>
@@ -1130,7 +1126,7 @@
             <a:fld id="{8B6559E1-F047-C244-B3F0-03E07E42B642}" type="datetimeFigureOut">
               <a:rPr lang="en-US" smtClean="0"/>
               <a:pPr/>
-              <a:t>9/4/12</a:t>
+              <a:t>9/7/12</a:t>
             </a:fld>
             <a:endParaRPr lang="en-US"/>
           </a:p>
@@ -1297,7 +1293,7 @@
             <a:fld id="{8B6559E1-F047-C244-B3F0-03E07E42B642}" type="datetimeFigureOut">
               <a:rPr lang="en-US" smtClean="0"/>
               <a:pPr/>
-              <a:t>9/4/12</a:t>
+              <a:t>9/7/12</a:t>
             </a:fld>
             <a:endParaRPr lang="en-US"/>
           </a:p>
@@ -1540,7 +1536,7 @@
             <a:fld id="{8B6559E1-F047-C244-B3F0-03E07E42B642}" type="datetimeFigureOut">
               <a:rPr lang="en-US" smtClean="0"/>
               <a:pPr/>
-              <a:t>9/4/12</a:t>
+              <a:t>9/7/12</a:t>
             </a:fld>
             <a:endParaRPr lang="en-US"/>
           </a:p>
@@ -1825,7 +1821,7 @@
             <a:fld id="{8B6559E1-F047-C244-B3F0-03E07E42B642}" type="datetimeFigureOut">
               <a:rPr lang="en-US" smtClean="0"/>
               <a:pPr/>
-              <a:t>9/4/12</a:t>
+              <a:t>9/7/12</a:t>
             </a:fld>
             <a:endParaRPr lang="en-US"/>
           </a:p>
@@ -2244,7 +2240,7 @@
             <a:fld id="{8B6559E1-F047-C244-B3F0-03E07E42B642}" type="datetimeFigureOut">
               <a:rPr lang="en-US" smtClean="0"/>
               <a:pPr/>
-              <a:t>9/4/12</a:t>
+              <a:t>9/7/12</a:t>
             </a:fld>
             <a:endParaRPr lang="en-US"/>
           </a:p>
@@ -2359,7 +2355,7 @@
             <a:fld id="{8B6559E1-F047-C244-B3F0-03E07E42B642}" type="datetimeFigureOut">
               <a:rPr lang="en-US" smtClean="0"/>
               <a:pPr/>
-              <a:t>9/4/12</a:t>
+              <a:t>9/7/12</a:t>
             </a:fld>
             <a:endParaRPr lang="en-US"/>
           </a:p>
@@ -2451,7 +2447,7 @@
             <a:fld id="{8B6559E1-F047-C244-B3F0-03E07E42B642}" type="datetimeFigureOut">
               <a:rPr lang="en-US" smtClean="0"/>
               <a:pPr/>
-              <a:t>9/4/12</a:t>
+              <a:t>9/7/12</a:t>
             </a:fld>
             <a:endParaRPr lang="en-US"/>
           </a:p>
@@ -2725,7 +2721,7 @@
             <a:fld id="{8B6559E1-F047-C244-B3F0-03E07E42B642}" type="datetimeFigureOut">
               <a:rPr lang="en-US" smtClean="0"/>
               <a:pPr/>
-              <a:t>9/4/12</a:t>
+              <a:t>9/7/12</a:t>
             </a:fld>
             <a:endParaRPr lang="en-US"/>
           </a:p>
@@ -2975,7 +2971,7 @@
             <a:fld id="{8B6559E1-F047-C244-B3F0-03E07E42B642}" type="datetimeFigureOut">
               <a:rPr lang="en-US" smtClean="0"/>
               <a:pPr/>
-              <a:t>9/4/12</a:t>
+              <a:t>9/7/12</a:t>
             </a:fld>
             <a:endParaRPr lang="en-US"/>
           </a:p>
@@ -3185,7 +3181,7 @@
             <a:fld id="{8B6559E1-F047-C244-B3F0-03E07E42B642}" type="datetimeFigureOut">
               <a:rPr lang="en-US" smtClean="0"/>
               <a:pPr/>
-              <a:t>9/4/12</a:t>
+              <a:t>9/7/12</a:t>
             </a:fld>
             <a:endParaRPr lang="en-US"/>
           </a:p>
@@ -3783,11 +3779,7 @@
           <a:p>
             <a:r>
               <a:rPr lang="en-US" dirty="0" err="1" smtClean="0"/>
-              <a:t>http://www.r-</a:t>
-            </a:r>
-            <a:r>
-              <a:rPr lang="en-US" dirty="0" err="1" smtClean="0"/>
-              <a:t>project.org</a:t>
+              <a:t>http://www.r-project.org</a:t>
             </a:r>
             <a:endParaRPr lang="en-US" dirty="0" smtClean="0"/>
           </a:p>
@@ -3899,11 +3891,7 @@
           <a:p>
             <a:r>
               <a:rPr lang="en-US" dirty="0" smtClean="0"/>
-              <a:t>http</a:t>
-            </a:r>
-            <a:r>
-              <a:rPr lang="en-US" dirty="0" smtClean="0"/>
-              <a:t>://</a:t>
+              <a:t>http://</a:t>
             </a:r>
             <a:r>
               <a:rPr lang="en-US" dirty="0" err="1" smtClean="0"/>
@@ -3990,11 +3978,7 @@
           <a:p>
             <a:r>
               <a:rPr lang="en-US" dirty="0" smtClean="0"/>
-              <a:t>Exercise:</a:t>
-            </a:r>
-            <a:r>
-              <a:rPr lang="en-US" dirty="0" smtClean="0"/>
-              <a:t> installation</a:t>
+              <a:t>Exercise: installation</a:t>
             </a:r>
             <a:endParaRPr lang="en-US" dirty="0"/>
           </a:p>
@@ -4284,11 +4268,7 @@
           <a:p>
             <a:r>
               <a:rPr lang="en-US" dirty="0" smtClean="0"/>
-              <a:t>Learn a scripting language and </a:t>
-            </a:r>
-            <a:r>
-              <a:rPr lang="en-US" dirty="0" smtClean="0"/>
-              <a:t>toolkit!</a:t>
+              <a:t>Learn a scripting language and toolkit!</a:t>
             </a:r>
             <a:endParaRPr lang="en-US" dirty="0"/>
           </a:p>
@@ -4406,14 +4386,25 @@
               <a:rPr lang="en-US" dirty="0" smtClean="0"/>
               <a:t>Fast</a:t>
             </a:r>
+          </a:p>
+          <a:p>
+            <a:pPr lvl="1"/>
+            <a:r>
+              <a:rPr lang="en-US" dirty="0" smtClean="0"/>
+              <a:t>Ubiquitous</a:t>
+            </a:r>
+          </a:p>
+          <a:p>
+            <a:pPr lvl="1"/>
+            <a:r>
+              <a:rPr lang="en-US" dirty="0" smtClean="0"/>
+              <a:t>tight integration with Unix</a:t>
+            </a:r>
+            <a:r>
+              <a:rPr lang="en-US" dirty="0" smtClean="0"/>
+              <a:t> </a:t>
+            </a:r>
             <a:endParaRPr lang="en-US" dirty="0" smtClean="0"/>
-          </a:p>
-          <a:p>
-            <a:pPr lvl="1"/>
-            <a:r>
-              <a:rPr lang="en-US" dirty="0" smtClean="0"/>
-              <a:t>Ubiquitous </a:t>
-            </a:r>
           </a:p>
           <a:p>
             <a:r>
@@ -4973,11 +4964,7 @@
           <a:p>
             <a:r>
               <a:rPr lang="en-US" sz="2800" dirty="0" smtClean="0"/>
-              <a:t>http</a:t>
-            </a:r>
-            <a:r>
-              <a:rPr lang="en-US" sz="2800" dirty="0" smtClean="0"/>
-              <a:t>://</a:t>
+              <a:t>http://</a:t>
             </a:r>
             <a:r>
               <a:rPr lang="en-US" sz="2800" dirty="0" err="1" smtClean="0"/>
@@ -4985,19 +4972,11 @@
             </a:r>
             <a:r>
               <a:rPr lang="en-US" sz="2800" dirty="0" smtClean="0"/>
-              <a:t>, https</a:t>
-            </a:r>
-            <a:r>
-              <a:rPr lang="en-US" sz="2800" dirty="0" smtClean="0"/>
-              <a:t>://</a:t>
+              <a:t>, https://</a:t>
             </a:r>
             <a:r>
               <a:rPr lang="en-US" sz="2800" dirty="0" err="1" smtClean="0"/>
-              <a:t>github.com/</a:t>
-            </a:r>
-            <a:r>
-              <a:rPr lang="en-US" sz="2800" dirty="0" err="1" smtClean="0"/>
-              <a:t>biopython</a:t>
+              <a:t>github.com/biopython</a:t>
             </a:r>
             <a:endParaRPr lang="en-US" sz="2800" dirty="0" smtClean="0"/>
           </a:p>
@@ -5119,7 +5098,9 @@
         </p:nvSpPr>
         <p:spPr/>
         <p:txBody>
-          <a:bodyPr/>
+          <a:bodyPr>
+            <a:normAutofit lnSpcReduction="10000"/>
+          </a:bodyPr>
           <a:lstStyle/>
           <a:p>
             <a:r>
@@ -5145,8 +5126,24 @@
             <a:pPr lvl="1"/>
             <a:r>
               <a:rPr lang="en-US" dirty="0" smtClean="0"/>
-              <a:t>Gem packages</a:t>
-            </a:r>
+              <a:t>Gem </a:t>
+            </a:r>
+            <a:r>
+              <a:rPr lang="en-US" dirty="0" smtClean="0"/>
+              <a:t>packages</a:t>
+            </a:r>
+          </a:p>
+          <a:p>
+            <a:pPr lvl="1"/>
+            <a:r>
+              <a:rPr lang="en-US" dirty="0" smtClean="0"/>
+              <a:t>Rails great for </a:t>
+            </a:r>
+            <a:r>
+              <a:rPr lang="en-US" smtClean="0"/>
+              <a:t>web applications</a:t>
+            </a:r>
+            <a:endParaRPr lang="en-US" smtClean="0"/>
           </a:p>
           <a:p>
             <a:r>
@@ -5190,7 +5187,9 @@
         </p:nvSpPr>
         <p:spPr/>
         <p:txBody>
-          <a:bodyPr/>
+          <a:bodyPr>
+            <a:normAutofit lnSpcReduction="10000"/>
+          </a:bodyPr>
           <a:lstStyle/>
           <a:p>
             <a:r>
@@ -5203,11 +5202,7 @@
             </a:r>
             <a:r>
               <a:rPr lang="en-US" dirty="0" smtClean="0"/>
-              <a:t>" </a:t>
-            </a:r>
-            <a:r>
-              <a:rPr lang="en-US" dirty="0" smtClean="0"/>
-              <a:t>Matsumoto</a:t>
+              <a:t>" Matsumoto</a:t>
             </a:r>
           </a:p>
           <a:p>
@@ -5225,11 +5220,7 @@
           <a:p>
             <a:r>
               <a:rPr lang="en-US" dirty="0" err="1" smtClean="0"/>
-              <a:t>http://www.ruby-</a:t>
-            </a:r>
-            <a:r>
-              <a:rPr lang="en-US" dirty="0" err="1" smtClean="0"/>
-              <a:t>lang.org</a:t>
+              <a:t>http://www.ruby-lang.org</a:t>
             </a:r>
             <a:endParaRPr lang="en-US" dirty="0" smtClean="0"/>
           </a:p>
@@ -5347,11 +5338,7 @@
             </a:r>
             <a:r>
               <a:rPr lang="en-US" dirty="0" err="1" smtClean="0"/>
-              <a:t>github.com/</a:t>
-            </a:r>
-            <a:r>
-              <a:rPr lang="en-US" dirty="0" err="1" smtClean="0"/>
-              <a:t>bioruby</a:t>
+              <a:t>github.com/bioruby</a:t>
             </a:r>
             <a:endParaRPr lang="en-US" dirty="0" smtClean="0"/>
           </a:p>
@@ -5365,11 +5352,7 @@
             <a:pPr lvl="1"/>
             <a:r>
               <a:rPr lang="en-US" sz="2000" dirty="0" err="1" smtClean="0"/>
-              <a:t>https://github.com/helios/bioruby-</a:t>
-            </a:r>
-            <a:r>
-              <a:rPr lang="en-US" sz="2000" dirty="0" err="1" smtClean="0"/>
-              <a:t>ngs</a:t>
+              <a:t>https://github.com/helios/bioruby-ngs</a:t>
             </a:r>
             <a:endParaRPr lang="en-US" sz="2000" dirty="0" smtClean="0"/>
           </a:p>

</xml_diff>